<commit_message>
added burndowchart ppoint sprint
</commit_message>
<xml_diff>
--- a/doc/Presentaties/DigilenderSprint1.pptx
+++ b/doc/Presentaties/DigilenderSprint1.pptx
@@ -213,7 +213,7 @@
           <a:effectLst/>
           <a:extLst>
             <a:ext uri="{91240B29-F687-4f45-9708-019B960494DF}">
-              <a14:hiddenLine xmlns:a14="http://schemas.microsoft.com/office/drawing/2010/main" xmlns="" w="9525">
+              <a14:hiddenLine xmlns="" xmlns:a14="http://schemas.microsoft.com/office/drawing/2010/main" w="9525">
                 <a:solidFill>
                   <a:srgbClr val="000000"/>
                 </a:solidFill>
@@ -406,7 +406,7 @@
             <a:fld id="{5586B75A-687E-405C-8A0B-8D00578BA2C3}" type="datetimeFigureOut">
               <a:rPr lang="en-US" smtClean="0"/>
               <a:pPr/>
-              <a:t>11/6/2018</a:t>
+              <a:t>11/7/2018</a:t>
             </a:fld>
             <a:endParaRPr lang="en-US" dirty="0"/>
           </a:p>
@@ -726,7 +726,7 @@
             <a:fld id="{5586B75A-687E-405C-8A0B-8D00578BA2C3}" type="datetimeFigureOut">
               <a:rPr lang="en-US" smtClean="0"/>
               <a:pPr/>
-              <a:t>11/6/2018</a:t>
+              <a:t>11/7/2018</a:t>
             </a:fld>
             <a:endParaRPr lang="en-US" dirty="0"/>
           </a:p>
@@ -1217,7 +1217,7 @@
             <a:fld id="{5586B75A-687E-405C-8A0B-8D00578BA2C3}" type="datetimeFigureOut">
               <a:rPr lang="en-US" smtClean="0"/>
               <a:pPr/>
-              <a:t>11/6/2018</a:t>
+              <a:t>11/7/2018</a:t>
             </a:fld>
             <a:endParaRPr lang="en-US" dirty="0"/>
           </a:p>
@@ -1589,7 +1589,7 @@
             <a:fld id="{5586B75A-687E-405C-8A0B-8D00578BA2C3}" type="datetimeFigureOut">
               <a:rPr lang="en-US" smtClean="0"/>
               <a:pPr/>
-              <a:t>11/6/2018</a:t>
+              <a:t>11/7/2018</a:t>
             </a:fld>
             <a:endParaRPr lang="en-US" dirty="0"/>
           </a:p>
@@ -1746,7 +1746,7 @@
           <a:ln/>
           <a:extLst>
             <a:ext uri="{91240B29-F687-4f45-9708-019B960494DF}">
-              <a14:hiddenLine xmlns:a14="http://schemas.microsoft.com/office/drawing/2010/main" xmlns="" w="9525">
+              <a14:hiddenLine xmlns="" xmlns:a14="http://schemas.microsoft.com/office/drawing/2010/main" w="9525">
                 <a:solidFill>
                   <a:srgbClr val="000000"/>
                 </a:solidFill>
@@ -1865,7 +1865,7 @@
             <a:fld id="{5586B75A-687E-405C-8A0B-8D00578BA2C3}" type="datetimeFigureOut">
               <a:rPr lang="en-US" smtClean="0"/>
               <a:pPr/>
-              <a:t>11/6/2018</a:t>
+              <a:t>11/7/2018</a:t>
             </a:fld>
             <a:endParaRPr lang="en-US" dirty="0"/>
           </a:p>
@@ -2023,7 +2023,7 @@
           <a:ln/>
           <a:extLst>
             <a:ext uri="{91240B29-F687-4f45-9708-019B960494DF}">
-              <a14:hiddenLine xmlns:a14="http://schemas.microsoft.com/office/drawing/2010/main" xmlns="" w="9525">
+              <a14:hiddenLine xmlns="" xmlns:a14="http://schemas.microsoft.com/office/drawing/2010/main" w="9525">
                 <a:solidFill>
                   <a:srgbClr val="000000"/>
                 </a:solidFill>
@@ -2152,7 +2152,7 @@
             <a:fld id="{5586B75A-687E-405C-8A0B-8D00578BA2C3}" type="datetimeFigureOut">
               <a:rPr lang="en-US" smtClean="0"/>
               <a:pPr/>
-              <a:t>11/6/2018</a:t>
+              <a:t>11/7/2018</a:t>
             </a:fld>
             <a:endParaRPr lang="en-US" dirty="0"/>
           </a:p>
@@ -2308,7 +2308,7 @@
           <a:ln/>
           <a:extLst>
             <a:ext uri="{91240B29-F687-4f45-9708-019B960494DF}">
-              <a14:hiddenLine xmlns:a14="http://schemas.microsoft.com/office/drawing/2010/main" xmlns="" w="9525">
+              <a14:hiddenLine xmlns="" xmlns:a14="http://schemas.microsoft.com/office/drawing/2010/main" w="9525">
                 <a:solidFill>
                   <a:srgbClr val="000000"/>
                 </a:solidFill>
@@ -2437,7 +2437,7 @@
             <a:fld id="{5586B75A-687E-405C-8A0B-8D00578BA2C3}" type="datetimeFigureOut">
               <a:rPr lang="en-US" smtClean="0"/>
               <a:pPr/>
-              <a:t>11/6/2018</a:t>
+              <a:t>11/7/2018</a:t>
             </a:fld>
             <a:endParaRPr lang="en-US" dirty="0"/>
           </a:p>
@@ -2782,7 +2782,7 @@
             <a:fld id="{5586B75A-687E-405C-8A0B-8D00578BA2C3}" type="datetimeFigureOut">
               <a:rPr lang="en-US" smtClean="0"/>
               <a:pPr/>
-              <a:t>11/6/2018</a:t>
+              <a:t>11/7/2018</a:t>
             </a:fld>
             <a:endParaRPr lang="en-US" dirty="0"/>
           </a:p>
@@ -2938,7 +2938,7 @@
           <a:ln/>
           <a:extLst>
             <a:ext uri="{91240B29-F687-4f45-9708-019B960494DF}">
-              <a14:hiddenLine xmlns:a14="http://schemas.microsoft.com/office/drawing/2010/main" xmlns="" w="9525">
+              <a14:hiddenLine xmlns="" xmlns:a14="http://schemas.microsoft.com/office/drawing/2010/main" w="9525">
                 <a:solidFill>
                   <a:srgbClr val="000000"/>
                 </a:solidFill>
@@ -3123,7 +3123,7 @@
             <a:fld id="{5586B75A-687E-405C-8A0B-8D00578BA2C3}" type="datetimeFigureOut">
               <a:rPr lang="en-US" smtClean="0"/>
               <a:pPr/>
-              <a:t>11/6/2018</a:t>
+              <a:t>11/7/2018</a:t>
             </a:fld>
             <a:endParaRPr lang="en-US" dirty="0"/>
           </a:p>
@@ -3279,7 +3279,7 @@
           <a:ln/>
           <a:extLst>
             <a:ext uri="{91240B29-F687-4f45-9708-019B960494DF}">
-              <a14:hiddenLine xmlns:a14="http://schemas.microsoft.com/office/drawing/2010/main" xmlns="" w="9525">
+              <a14:hiddenLine xmlns="" xmlns:a14="http://schemas.microsoft.com/office/drawing/2010/main" w="9525">
                 <a:solidFill>
                   <a:srgbClr val="000000"/>
                 </a:solidFill>
@@ -3602,7 +3602,7 @@
             <a:fld id="{5586B75A-687E-405C-8A0B-8D00578BA2C3}" type="datetimeFigureOut">
               <a:rPr lang="en-US" smtClean="0"/>
               <a:pPr/>
-              <a:t>11/6/2018</a:t>
+              <a:t>11/7/2018</a:t>
             </a:fld>
             <a:endParaRPr lang="en-US" dirty="0"/>
           </a:p>
@@ -3758,7 +3758,7 @@
           <a:ln/>
           <a:extLst>
             <a:ext uri="{91240B29-F687-4f45-9708-019B960494DF}">
-              <a14:hiddenLine xmlns:a14="http://schemas.microsoft.com/office/drawing/2010/main" xmlns="" w="9525">
+              <a14:hiddenLine xmlns="" xmlns:a14="http://schemas.microsoft.com/office/drawing/2010/main" w="9525">
                 <a:solidFill>
                   <a:srgbClr val="000000"/>
                 </a:solidFill>
@@ -3825,7 +3825,7 @@
             <a:fld id="{5586B75A-687E-405C-8A0B-8D00578BA2C3}" type="datetimeFigureOut">
               <a:rPr lang="en-US" smtClean="0"/>
               <a:pPr/>
-              <a:t>11/6/2018</a:t>
+              <a:t>11/7/2018</a:t>
             </a:fld>
             <a:endParaRPr lang="en-US" dirty="0"/>
           </a:p>
@@ -3922,7 +3922,7 @@
             <a:fld id="{5586B75A-687E-405C-8A0B-8D00578BA2C3}" type="datetimeFigureOut">
               <a:rPr lang="en-US" smtClean="0"/>
               <a:pPr/>
-              <a:t>11/6/2018</a:t>
+              <a:t>11/7/2018</a:t>
             </a:fld>
             <a:endParaRPr lang="en-US" dirty="0"/>
           </a:p>
@@ -4191,7 +4191,7 @@
           <a:ln/>
           <a:extLst>
             <a:ext uri="{91240B29-F687-4f45-9708-019B960494DF}">
-              <a14:hiddenLine xmlns:a14="http://schemas.microsoft.com/office/drawing/2010/main" xmlns="" w="9525">
+              <a14:hiddenLine xmlns="" xmlns:a14="http://schemas.microsoft.com/office/drawing/2010/main" w="9525">
                 <a:solidFill>
                   <a:srgbClr val="000000"/>
                 </a:solidFill>
@@ -4391,7 +4391,7 @@
             <a:fld id="{5586B75A-687E-405C-8A0B-8D00578BA2C3}" type="datetimeFigureOut">
               <a:rPr lang="en-US" smtClean="0"/>
               <a:pPr/>
-              <a:t>11/6/2018</a:t>
+              <a:t>11/7/2018</a:t>
             </a:fld>
             <a:endParaRPr lang="en-US" dirty="0"/>
           </a:p>
@@ -4706,7 +4706,7 @@
             <a:fld id="{5586B75A-687E-405C-8A0B-8D00578BA2C3}" type="datetimeFigureOut">
               <a:rPr lang="en-US" smtClean="0"/>
               <a:pPr/>
-              <a:t>11/6/2018</a:t>
+              <a:t>11/7/2018</a:t>
             </a:fld>
             <a:endParaRPr lang="en-US" dirty="0"/>
           </a:p>
@@ -4979,7 +4979,7 @@
             <a:fld id="{5586B75A-687E-405C-8A0B-8D00578BA2C3}" type="datetimeFigureOut">
               <a:rPr lang="en-US" smtClean="0"/>
               <a:pPr/>
-              <a:t>11/6/2018</a:t>
+              <a:t>11/7/2018</a:t>
             </a:fld>
             <a:endParaRPr lang="en-US" dirty="0"/>
           </a:p>
@@ -5697,7 +5697,7 @@
           <a:effectLst/>
           <a:extLst>
             <a:ext uri="{91240B29-F687-4f45-9708-019B960494DF}">
-              <a14:hiddenLine xmlns="" xmlns:a16="http://schemas.microsoft.com/office/drawing/2014/main" xmlns:p14="http://schemas.microsoft.com/office/powerpoint/2010/main" xmlns:a14="http://schemas.microsoft.com/office/drawing/2010/main" w="9525">
+              <a14:hiddenLine xmlns:a14="http://schemas.microsoft.com/office/drawing/2010/main" xmlns:p14="http://schemas.microsoft.com/office/powerpoint/2010/main" xmlns:a16="http://schemas.microsoft.com/office/drawing/2014/main" xmlns="" w="9525">
                 <a:solidFill>
                   <a:srgbClr val="000000"/>
                 </a:solidFill>
@@ -5999,7 +5999,7 @@
           <a:ln/>
           <a:extLst>
             <a:ext uri="{91240B29-F687-4f45-9708-019B960494DF}">
-              <a14:hiddenLine xmlns="" xmlns:a16="http://schemas.microsoft.com/office/drawing/2014/main" xmlns:a14="http://schemas.microsoft.com/office/drawing/2010/main" xmlns:p14="http://schemas.microsoft.com/office/powerpoint/2010/main" w="9525">
+              <a14:hiddenLine xmlns:p14="http://schemas.microsoft.com/office/powerpoint/2010/main" xmlns:a14="http://schemas.microsoft.com/office/drawing/2010/main" xmlns:a16="http://schemas.microsoft.com/office/drawing/2014/main" xmlns="" w="9525">
                 <a:solidFill>
                   <a:srgbClr val="000000"/>
                 </a:solidFill>
@@ -7103,7 +7103,7 @@
                 <a:hlinkClick r:id="rId2">
                   <a:extLst>
                     <a:ext uri="{A12FA001-AC4F-418D-AE19-62706E023703}">
-                      <ahyp:hlinkClr xmlns:ahyp="http://schemas.microsoft.com/office/drawing/2018/hyperlinkcolor" val="tx"/>
+                      <ahyp:hlinkClr xmlns:ahyp="http://schemas.microsoft.com/office/drawing/2018/hyperlinkcolor" xmlns="" val="tx"/>
                     </a:ext>
                   </a:extLst>
                 </a:hlinkClick>
@@ -7118,6 +7118,36 @@
           </a:p>
         </p:txBody>
       </p:sp>
+      <p:pic>
+        <p:nvPicPr>
+          <p:cNvPr id="3" name="Afbeelding 2">
+            <a:extLst>
+              <a:ext uri="{FF2B5EF4-FFF2-40B4-BE49-F238E27FC236}">
+                <a16:creationId xmlns:a16="http://schemas.microsoft.com/office/drawing/2014/main" id="{E5985662-20A4-47AD-B5BE-7D6E8AC307DC}"/>
+              </a:ext>
+            </a:extLst>
+          </p:cNvPr>
+          <p:cNvPicPr>
+            <a:picLocks noChangeAspect="1"/>
+          </p:cNvPicPr>
+          <p:nvPr/>
+        </p:nvPicPr>
+        <p:blipFill>
+          <a:blip r:embed="rId3"/>
+          <a:stretch>
+            <a:fillRect/>
+          </a:stretch>
+        </p:blipFill>
+        <p:spPr>
+          <a:xfrm>
+            <a:off x="942109" y="2476150"/>
+            <a:ext cx="10307782" cy="3507422"/>
+          </a:xfrm>
+          <a:prstGeom prst="rect">
+            <a:avLst/>
+          </a:prstGeom>
+        </p:spPr>
+      </p:pic>
     </p:spTree>
     <p:extLst>
       <p:ext uri="{BB962C8B-B14F-4D97-AF65-F5344CB8AC3E}">
@@ -7254,7 +7284,7 @@
           <a:effectLst/>
           <a:extLst>
             <a:ext uri="{91240B29-F687-4f45-9708-019B960494DF}">
-              <a14:hiddenLine xmlns="" xmlns:a16="http://schemas.microsoft.com/office/drawing/2014/main" xmlns:p14="http://schemas.microsoft.com/office/powerpoint/2010/main" xmlns:a14="http://schemas.microsoft.com/office/drawing/2010/main" w="9525">
+              <a14:hiddenLine xmlns:a14="http://schemas.microsoft.com/office/drawing/2010/main" xmlns:p14="http://schemas.microsoft.com/office/powerpoint/2010/main" xmlns:a16="http://schemas.microsoft.com/office/drawing/2014/main" xmlns="" w="9525">
                 <a:solidFill>
                   <a:srgbClr val="000000"/>
                 </a:solidFill>
@@ -7415,7 +7445,7 @@
                 <a:hlinkClick r:id="rId3">
                   <a:extLst>
                     <a:ext uri="{A12FA001-AC4F-418D-AE19-62706E023703}">
-                      <ahyp:hlinkClr xmlns:ahyp="http://schemas.microsoft.com/office/drawing/2018/hyperlinkcolor" val="tx"/>
+                      <ahyp:hlinkClr xmlns:ahyp="http://schemas.microsoft.com/office/drawing/2018/hyperlinkcolor" xmlns="" val="tx"/>
                     </a:ext>
                   </a:extLst>
                 </a:hlinkClick>

</xml_diff>